<commit_message>
Updated WDS markdown and related diagrams
</commit_message>
<xml_diff>
--- a/Whiteboard design session/Diagrams.pptx
+++ b/Whiteboard design session/Diagrams.pptx
@@ -264,7 +264,7 @@
           <a:p>
             <a:fld id="{7197974A-2564-4B50-81B9-7BC2278DE874}" type="datetimeFigureOut">
               <a:rPr lang="en-US" smtClean="0"/>
-              <a:t>6/5/2019</a:t>
+              <a:t>6/19/2020</a:t>
             </a:fld>
             <a:endParaRPr lang="en-US"/>
           </a:p>
@@ -462,7 +462,7 @@
           <a:p>
             <a:fld id="{7197974A-2564-4B50-81B9-7BC2278DE874}" type="datetimeFigureOut">
               <a:rPr lang="en-US" smtClean="0"/>
-              <a:t>6/5/2019</a:t>
+              <a:t>6/19/2020</a:t>
             </a:fld>
             <a:endParaRPr lang="en-US"/>
           </a:p>
@@ -670,7 +670,7 @@
           <a:p>
             <a:fld id="{7197974A-2564-4B50-81B9-7BC2278DE874}" type="datetimeFigureOut">
               <a:rPr lang="en-US" smtClean="0"/>
-              <a:t>6/5/2019</a:t>
+              <a:t>6/19/2020</a:t>
             </a:fld>
             <a:endParaRPr lang="en-US"/>
           </a:p>
@@ -868,7 +868,7 @@
           <a:p>
             <a:fld id="{7197974A-2564-4B50-81B9-7BC2278DE874}" type="datetimeFigureOut">
               <a:rPr lang="en-US" smtClean="0"/>
-              <a:t>6/5/2019</a:t>
+              <a:t>6/19/2020</a:t>
             </a:fld>
             <a:endParaRPr lang="en-US"/>
           </a:p>
@@ -1143,7 +1143,7 @@
           <a:p>
             <a:fld id="{7197974A-2564-4B50-81B9-7BC2278DE874}" type="datetimeFigureOut">
               <a:rPr lang="en-US" smtClean="0"/>
-              <a:t>6/5/2019</a:t>
+              <a:t>6/19/2020</a:t>
             </a:fld>
             <a:endParaRPr lang="en-US"/>
           </a:p>
@@ -1408,7 +1408,7 @@
           <a:p>
             <a:fld id="{7197974A-2564-4B50-81B9-7BC2278DE874}" type="datetimeFigureOut">
               <a:rPr lang="en-US" smtClean="0"/>
-              <a:t>6/5/2019</a:t>
+              <a:t>6/19/2020</a:t>
             </a:fld>
             <a:endParaRPr lang="en-US"/>
           </a:p>
@@ -1820,7 +1820,7 @@
           <a:p>
             <a:fld id="{7197974A-2564-4B50-81B9-7BC2278DE874}" type="datetimeFigureOut">
               <a:rPr lang="en-US" smtClean="0"/>
-              <a:t>6/5/2019</a:t>
+              <a:t>6/19/2020</a:t>
             </a:fld>
             <a:endParaRPr lang="en-US"/>
           </a:p>
@@ -1961,7 +1961,7 @@
           <a:p>
             <a:fld id="{7197974A-2564-4B50-81B9-7BC2278DE874}" type="datetimeFigureOut">
               <a:rPr lang="en-US" smtClean="0"/>
-              <a:t>6/5/2019</a:t>
+              <a:t>6/19/2020</a:t>
             </a:fld>
             <a:endParaRPr lang="en-US"/>
           </a:p>
@@ -2074,7 +2074,7 @@
           <a:p>
             <a:fld id="{7197974A-2564-4B50-81B9-7BC2278DE874}" type="datetimeFigureOut">
               <a:rPr lang="en-US" smtClean="0"/>
-              <a:t>6/5/2019</a:t>
+              <a:t>6/19/2020</a:t>
             </a:fld>
             <a:endParaRPr lang="en-US"/>
           </a:p>
@@ -2385,7 +2385,7 @@
           <a:p>
             <a:fld id="{7197974A-2564-4B50-81B9-7BC2278DE874}" type="datetimeFigureOut">
               <a:rPr lang="en-US" smtClean="0"/>
-              <a:t>6/5/2019</a:t>
+              <a:t>6/19/2020</a:t>
             </a:fld>
             <a:endParaRPr lang="en-US"/>
           </a:p>
@@ -2673,7 +2673,7 @@
           <a:p>
             <a:fld id="{7197974A-2564-4B50-81B9-7BC2278DE874}" type="datetimeFigureOut">
               <a:rPr lang="en-US" smtClean="0"/>
-              <a:t>6/5/2019</a:t>
+              <a:t>6/19/2020</a:t>
             </a:fld>
             <a:endParaRPr lang="en-US"/>
           </a:p>
@@ -2914,7 +2914,7 @@
           <a:p>
             <a:fld id="{7197974A-2564-4B50-81B9-7BC2278DE874}" type="datetimeFigureOut">
               <a:rPr lang="en-US" smtClean="0"/>
-              <a:t>6/5/2019</a:t>
+              <a:t>6/19/2020</a:t>
             </a:fld>
             <a:endParaRPr lang="en-US"/>
           </a:p>
@@ -5233,6 +5233,200 @@
           </p:spPr>
         </p:pic>
       </p:grpSp>
+      <p:grpSp>
+        <p:nvGrpSpPr>
+          <p:cNvPr id="21" name="Group 20">
+            <a:extLst>
+              <a:ext uri="{FF2B5EF4-FFF2-40B4-BE49-F238E27FC236}">
+                <a16:creationId xmlns:a16="http://schemas.microsoft.com/office/drawing/2014/main" id="{7BA8FC8E-6331-42AB-AB9E-388CB0833E23}"/>
+              </a:ext>
+            </a:extLst>
+          </p:cNvPr>
+          <p:cNvGrpSpPr/>
+          <p:nvPr/>
+        </p:nvGrpSpPr>
+        <p:grpSpPr>
+          <a:xfrm>
+            <a:off x="841526" y="4795500"/>
+            <a:ext cx="1352348" cy="1088997"/>
+            <a:chOff x="841526" y="4759808"/>
+            <a:chExt cx="1352348" cy="1088997"/>
+          </a:xfrm>
+        </p:grpSpPr>
+        <p:pic>
+          <p:nvPicPr>
+            <p:cNvPr id="3" name="Graphic 2">
+              <a:extLst>
+                <a:ext uri="{FF2B5EF4-FFF2-40B4-BE49-F238E27FC236}">
+                  <a16:creationId xmlns:a16="http://schemas.microsoft.com/office/drawing/2014/main" id="{0C7D8724-4E88-413E-A094-5D241CA6D464}"/>
+                </a:ext>
+              </a:extLst>
+            </p:cNvPr>
+            <p:cNvPicPr>
+              <a:picLocks noChangeAspect="1"/>
+            </p:cNvPicPr>
+            <p:nvPr/>
+          </p:nvPicPr>
+          <p:blipFill>
+            <a:blip r:embed="rId18">
+              <a:extLst>
+                <a:ext uri="{28A0092B-C50C-407E-A947-70E740481C1C}">
+                  <a14:useLocalDpi xmlns:a14="http://schemas.microsoft.com/office/drawing/2010/main" val="0"/>
+                </a:ext>
+                <a:ext uri="{96DAC541-7B7A-43D3-8B79-37D633B846F1}">
+                  <asvg:svgBlip xmlns:asvg="http://schemas.microsoft.com/office/drawing/2016/SVG/main" r:embed="rId19"/>
+                </a:ext>
+              </a:extLst>
+            </a:blip>
+            <a:stretch>
+              <a:fillRect/>
+            </a:stretch>
+          </p:blipFill>
+          <p:spPr>
+            <a:xfrm>
+              <a:off x="1127555" y="4759808"/>
+              <a:ext cx="780290" cy="780290"/>
+            </a:xfrm>
+            <a:prstGeom prst="rect">
+              <a:avLst/>
+            </a:prstGeom>
+          </p:spPr>
+        </p:pic>
+        <p:sp>
+          <p:nvSpPr>
+            <p:cNvPr id="18" name="TextBox 17">
+              <a:extLst>
+                <a:ext uri="{FF2B5EF4-FFF2-40B4-BE49-F238E27FC236}">
+                  <a16:creationId xmlns:a16="http://schemas.microsoft.com/office/drawing/2014/main" id="{BE162AB6-6F2F-4DF1-BDCE-4D9A1C83D751}"/>
+                </a:ext>
+              </a:extLst>
+            </p:cNvPr>
+            <p:cNvSpPr txBox="1"/>
+            <p:nvPr/>
+          </p:nvSpPr>
+          <p:spPr>
+            <a:xfrm>
+              <a:off x="841526" y="5541028"/>
+              <a:ext cx="1352348" cy="307777"/>
+            </a:xfrm>
+            <a:prstGeom prst="rect">
+              <a:avLst/>
+            </a:prstGeom>
+            <a:noFill/>
+          </p:spPr>
+          <p:txBody>
+            <a:bodyPr wrap="square" rtlCol="0">
+              <a:spAutoFit/>
+            </a:bodyPr>
+            <a:lstStyle/>
+            <a:p>
+              <a:pPr algn="ctr"/>
+              <a:r>
+                <a:rPr lang="en-US" sz="1400" dirty="0"/>
+                <a:t>Azure Monitor</a:t>
+              </a:r>
+              <a:endParaRPr lang="en-US" sz="1000" dirty="0"/>
+            </a:p>
+          </p:txBody>
+        </p:sp>
+      </p:grpSp>
+      <p:grpSp>
+        <p:nvGrpSpPr>
+          <p:cNvPr id="24" name="Group 23">
+            <a:extLst>
+              <a:ext uri="{FF2B5EF4-FFF2-40B4-BE49-F238E27FC236}">
+                <a16:creationId xmlns:a16="http://schemas.microsoft.com/office/drawing/2014/main" id="{DD32E67C-AF73-4DD0-B47E-E24142A4E337}"/>
+              </a:ext>
+            </a:extLst>
+          </p:cNvPr>
+          <p:cNvGrpSpPr/>
+          <p:nvPr/>
+        </p:nvGrpSpPr>
+        <p:grpSpPr>
+          <a:xfrm>
+            <a:off x="2215379" y="4795500"/>
+            <a:ext cx="1352348" cy="1088067"/>
+            <a:chOff x="2215379" y="4759808"/>
+            <a:chExt cx="1352348" cy="1088067"/>
+          </a:xfrm>
+        </p:grpSpPr>
+        <p:pic>
+          <p:nvPicPr>
+            <p:cNvPr id="16" name="Graphic 15">
+              <a:extLst>
+                <a:ext uri="{FF2B5EF4-FFF2-40B4-BE49-F238E27FC236}">
+                  <a16:creationId xmlns:a16="http://schemas.microsoft.com/office/drawing/2014/main" id="{83110F5A-A31C-4EA5-A301-89FA8C2F70CD}"/>
+                </a:ext>
+              </a:extLst>
+            </p:cNvPr>
+            <p:cNvPicPr>
+              <a:picLocks noChangeAspect="1"/>
+            </p:cNvPicPr>
+            <p:nvPr/>
+          </p:nvPicPr>
+          <p:blipFill>
+            <a:blip r:embed="rId20">
+              <a:extLst>
+                <a:ext uri="{28A0092B-C50C-407E-A947-70E740481C1C}">
+                  <a14:useLocalDpi xmlns:a14="http://schemas.microsoft.com/office/drawing/2010/main" val="0"/>
+                </a:ext>
+                <a:ext uri="{96DAC541-7B7A-43D3-8B79-37D633B846F1}">
+                  <asvg:svgBlip xmlns:asvg="http://schemas.microsoft.com/office/drawing/2016/SVG/main" r:embed="rId21"/>
+                </a:ext>
+              </a:extLst>
+            </a:blip>
+            <a:stretch>
+              <a:fillRect/>
+            </a:stretch>
+          </p:blipFill>
+          <p:spPr>
+            <a:xfrm>
+              <a:off x="2502935" y="4759808"/>
+              <a:ext cx="780290" cy="780290"/>
+            </a:xfrm>
+            <a:prstGeom prst="rect">
+              <a:avLst/>
+            </a:prstGeom>
+          </p:spPr>
+        </p:pic>
+        <p:sp>
+          <p:nvSpPr>
+            <p:cNvPr id="20" name="TextBox 19">
+              <a:extLst>
+                <a:ext uri="{FF2B5EF4-FFF2-40B4-BE49-F238E27FC236}">
+                  <a16:creationId xmlns:a16="http://schemas.microsoft.com/office/drawing/2014/main" id="{A9772A2B-15BE-4BF5-988B-BC4CC1C66855}"/>
+                </a:ext>
+              </a:extLst>
+            </p:cNvPr>
+            <p:cNvSpPr txBox="1"/>
+            <p:nvPr/>
+          </p:nvSpPr>
+          <p:spPr>
+            <a:xfrm>
+              <a:off x="2215379" y="5540098"/>
+              <a:ext cx="1352348" cy="307777"/>
+            </a:xfrm>
+            <a:prstGeom prst="rect">
+              <a:avLst/>
+            </a:prstGeom>
+            <a:noFill/>
+          </p:spPr>
+          <p:txBody>
+            <a:bodyPr wrap="square" rtlCol="0">
+              <a:spAutoFit/>
+            </a:bodyPr>
+            <a:lstStyle/>
+            <a:p>
+              <a:pPr algn="ctr"/>
+              <a:r>
+                <a:rPr lang="en-US" sz="1400" dirty="0"/>
+                <a:t>Azure Key Vault</a:t>
+              </a:r>
+              <a:endParaRPr lang="en-US" sz="1000" dirty="0"/>
+            </a:p>
+          </p:txBody>
+        </p:sp>
+      </p:grpSp>
     </p:spTree>
     <p:extLst>
       <p:ext uri="{BB962C8B-B14F-4D97-AF65-F5344CB8AC3E}">

</xml_diff>

<commit_message>
Finished WDS markdown and slide deck changes
</commit_message>
<xml_diff>
--- a/Whiteboard design session/Diagrams.pptx
+++ b/Whiteboard design session/Diagrams.pptx
@@ -11,6 +11,7 @@
     <p:sldId id="259" r:id="rId5"/>
     <p:sldId id="260" r:id="rId6"/>
     <p:sldId id="261" r:id="rId7"/>
+    <p:sldId id="262" r:id="rId8"/>
   </p:sldIdLst>
   <p:sldSz cx="12192000" cy="6858000"/>
   <p:notesSz cx="6858000" cy="9144000"/>
@@ -9023,6 +9024,705 @@
 </p:sld>
 </file>
 
+<file path=ppt/slides/slide7.xml><?xml version="1.0" encoding="utf-8"?>
+<p:sld xmlns:a="http://schemas.openxmlformats.org/drawingml/2006/main" xmlns:r="http://schemas.openxmlformats.org/officeDocument/2006/relationships" xmlns:p="http://schemas.openxmlformats.org/presentationml/2006/main">
+  <p:cSld>
+    <p:spTree>
+      <p:nvGrpSpPr>
+        <p:cNvPr id="1" name=""/>
+        <p:cNvGrpSpPr/>
+        <p:nvPr/>
+      </p:nvGrpSpPr>
+      <p:grpSpPr>
+        <a:xfrm>
+          <a:off x="0" y="0"/>
+          <a:ext cx="0" cy="0"/>
+          <a:chOff x="0" y="0"/>
+          <a:chExt cx="0" cy="0"/>
+        </a:xfrm>
+      </p:grpSpPr>
+      <p:sp>
+        <p:nvSpPr>
+          <p:cNvPr id="14" name="TextBox 13">
+            <a:extLst>
+              <a:ext uri="{FF2B5EF4-FFF2-40B4-BE49-F238E27FC236}">
+                <a16:creationId xmlns:a16="http://schemas.microsoft.com/office/drawing/2014/main" id="{9861045D-2BFB-47F3-959E-FD3A1D8353FA}"/>
+              </a:ext>
+            </a:extLst>
+          </p:cNvPr>
+          <p:cNvSpPr txBox="1"/>
+          <p:nvPr/>
+        </p:nvSpPr>
+        <p:spPr>
+          <a:xfrm>
+            <a:off x="243733" y="344606"/>
+            <a:ext cx="5729261" cy="584775"/>
+          </a:xfrm>
+          <a:prstGeom prst="rect">
+            <a:avLst/>
+          </a:prstGeom>
+          <a:noFill/>
+        </p:spPr>
+        <p:txBody>
+          <a:bodyPr wrap="none" rtlCol="0">
+            <a:spAutoFit/>
+          </a:bodyPr>
+          <a:lstStyle/>
+          <a:p>
+            <a:r>
+              <a:rPr lang="en-US" sz="3200" dirty="0">
+                <a:solidFill>
+                  <a:srgbClr val="0070C0"/>
+                </a:solidFill>
+              </a:rPr>
+              <a:t>Visualizing Bulk Delay Predictions</a:t>
+            </a:r>
+          </a:p>
+        </p:txBody>
+      </p:sp>
+      <p:sp>
+        <p:nvSpPr>
+          <p:cNvPr id="37" name="TextBox 36">
+            <a:extLst>
+              <a:ext uri="{FF2B5EF4-FFF2-40B4-BE49-F238E27FC236}">
+                <a16:creationId xmlns:a16="http://schemas.microsoft.com/office/drawing/2014/main" id="{07C6412B-0A16-47E7-89B2-978A00414FCB}"/>
+              </a:ext>
+            </a:extLst>
+          </p:cNvPr>
+          <p:cNvSpPr txBox="1"/>
+          <p:nvPr/>
+        </p:nvSpPr>
+        <p:spPr>
+          <a:xfrm>
+            <a:off x="1843861" y="4631385"/>
+            <a:ext cx="2072042" cy="892552"/>
+          </a:xfrm>
+          <a:prstGeom prst="rect">
+            <a:avLst/>
+          </a:prstGeom>
+          <a:noFill/>
+        </p:spPr>
+        <p:txBody>
+          <a:bodyPr wrap="none" rtlCol="0">
+            <a:spAutoFit/>
+          </a:bodyPr>
+          <a:lstStyle/>
+          <a:p>
+            <a:r>
+              <a:rPr lang="en-US" sz="1300" i="1" dirty="0"/>
+              <a:t>Notebook uses a JDBC</a:t>
+            </a:r>
+          </a:p>
+          <a:p>
+            <a:r>
+              <a:rPr lang="en-US" sz="1300" i="1" dirty="0"/>
+              <a:t>connection to SQL Database</a:t>
+            </a:r>
+            <a:br>
+              <a:rPr lang="en-US" sz="1300" i="1" dirty="0"/>
+            </a:br>
+            <a:r>
+              <a:rPr lang="en-US" sz="1300" i="1" dirty="0"/>
+              <a:t>to write bulk delay</a:t>
+            </a:r>
+            <a:br>
+              <a:rPr lang="en-US" sz="1300" i="1" dirty="0"/>
+            </a:br>
+            <a:r>
+              <a:rPr lang="en-US" sz="1300" i="1" dirty="0"/>
+              <a:t>predictions</a:t>
+            </a:r>
+          </a:p>
+        </p:txBody>
+      </p:sp>
+      <p:cxnSp>
+        <p:nvCxnSpPr>
+          <p:cNvPr id="43" name="Connector: Elbow 42">
+            <a:extLst>
+              <a:ext uri="{FF2B5EF4-FFF2-40B4-BE49-F238E27FC236}">
+                <a16:creationId xmlns:a16="http://schemas.microsoft.com/office/drawing/2014/main" id="{369325CF-68FE-4690-8C1A-46F5FA7D6C9D}"/>
+              </a:ext>
+            </a:extLst>
+          </p:cNvPr>
+          <p:cNvCxnSpPr>
+            <a:cxnSpLocks/>
+            <a:stCxn id="27" idx="1"/>
+            <a:endCxn id="35" idx="3"/>
+          </p:cNvCxnSpPr>
+          <p:nvPr/>
+        </p:nvCxnSpPr>
+        <p:spPr>
+          <a:xfrm rot="10800000" flipV="1">
+            <a:off x="6966705" y="2554293"/>
+            <a:ext cx="1170616" cy="1050732"/>
+          </a:xfrm>
+          <a:prstGeom prst="bentConnector3">
+            <a:avLst>
+              <a:gd name="adj1" fmla="val 50000"/>
+            </a:avLst>
+          </a:prstGeom>
+          <a:ln>
+            <a:tailEnd type="triangle"/>
+          </a:ln>
+        </p:spPr>
+        <p:style>
+          <a:lnRef idx="3">
+            <a:schemeClr val="accent1"/>
+          </a:lnRef>
+          <a:fillRef idx="0">
+            <a:schemeClr val="accent1"/>
+          </a:fillRef>
+          <a:effectRef idx="2">
+            <a:schemeClr val="accent1"/>
+          </a:effectRef>
+          <a:fontRef idx="minor">
+            <a:schemeClr val="tx1"/>
+          </a:fontRef>
+        </p:style>
+      </p:cxnSp>
+      <p:grpSp>
+        <p:nvGrpSpPr>
+          <p:cNvPr id="26" name="Group 25">
+            <a:extLst>
+              <a:ext uri="{FF2B5EF4-FFF2-40B4-BE49-F238E27FC236}">
+                <a16:creationId xmlns:a16="http://schemas.microsoft.com/office/drawing/2014/main" id="{CED6DB04-C51C-48E4-AFC6-3C4C4471C8D9}"/>
+              </a:ext>
+            </a:extLst>
+          </p:cNvPr>
+          <p:cNvGrpSpPr/>
+          <p:nvPr/>
+        </p:nvGrpSpPr>
+        <p:grpSpPr>
+          <a:xfrm>
+            <a:off x="7922072" y="2164148"/>
+            <a:ext cx="1311417" cy="1537418"/>
+            <a:chOff x="9658004" y="1577670"/>
+            <a:chExt cx="1311417" cy="1537418"/>
+          </a:xfrm>
+        </p:grpSpPr>
+        <p:pic>
+          <p:nvPicPr>
+            <p:cNvPr id="27" name="Picture 26" descr="A close up of a logo&#10;&#10;Description generated with high confidence">
+              <a:extLst>
+                <a:ext uri="{FF2B5EF4-FFF2-40B4-BE49-F238E27FC236}">
+                  <a16:creationId xmlns:a16="http://schemas.microsoft.com/office/drawing/2014/main" id="{4F2BEED4-2ED3-408A-B438-88930D9D6195}"/>
+                </a:ext>
+              </a:extLst>
+            </p:cNvPr>
+            <p:cNvPicPr>
+              <a:picLocks noChangeAspect="1"/>
+            </p:cNvPicPr>
+            <p:nvPr/>
+          </p:nvPicPr>
+          <p:blipFill>
+            <a:blip r:embed="rId2">
+              <a:extLst>
+                <a:ext uri="{28A0092B-C50C-407E-A947-70E740481C1C}">
+                  <a14:useLocalDpi xmlns:a14="http://schemas.microsoft.com/office/drawing/2010/main" val="0"/>
+                </a:ext>
+              </a:extLst>
+            </a:blip>
+            <a:stretch>
+              <a:fillRect/>
+            </a:stretch>
+          </p:blipFill>
+          <p:spPr>
+            <a:xfrm>
+              <a:off x="9873253" y="1577670"/>
+              <a:ext cx="780290" cy="780290"/>
+            </a:xfrm>
+            <a:prstGeom prst="rect">
+              <a:avLst/>
+            </a:prstGeom>
+          </p:spPr>
+        </p:pic>
+        <p:sp>
+          <p:nvSpPr>
+            <p:cNvPr id="28" name="TextBox 27">
+              <a:extLst>
+                <a:ext uri="{FF2B5EF4-FFF2-40B4-BE49-F238E27FC236}">
+                  <a16:creationId xmlns:a16="http://schemas.microsoft.com/office/drawing/2014/main" id="{BD27FBBC-36BD-4684-BD8C-03E64028942E}"/>
+                </a:ext>
+              </a:extLst>
+            </p:cNvPr>
+            <p:cNvSpPr txBox="1"/>
+            <p:nvPr/>
+          </p:nvSpPr>
+          <p:spPr>
+            <a:xfrm>
+              <a:off x="9658004" y="2376424"/>
+              <a:ext cx="1311417" cy="738664"/>
+            </a:xfrm>
+            <a:prstGeom prst="rect">
+              <a:avLst/>
+            </a:prstGeom>
+            <a:noFill/>
+          </p:spPr>
+          <p:txBody>
+            <a:bodyPr wrap="square" rtlCol="0">
+              <a:spAutoFit/>
+            </a:bodyPr>
+            <a:lstStyle/>
+            <a:p>
+              <a:pPr algn="ctr"/>
+              <a:r>
+                <a:rPr lang="en-US" sz="1400" dirty="0"/>
+                <a:t>Visualize Delay Predictions on a Map</a:t>
+              </a:r>
+              <a:endParaRPr lang="en-US" sz="1000" dirty="0"/>
+            </a:p>
+          </p:txBody>
+        </p:sp>
+      </p:grpSp>
+      <p:grpSp>
+        <p:nvGrpSpPr>
+          <p:cNvPr id="32" name="Group 31">
+            <a:extLst>
+              <a:ext uri="{FF2B5EF4-FFF2-40B4-BE49-F238E27FC236}">
+                <a16:creationId xmlns:a16="http://schemas.microsoft.com/office/drawing/2014/main" id="{5BF2A4FE-C96D-4F98-8E6B-71CD3F9DC316}"/>
+              </a:ext>
+            </a:extLst>
+          </p:cNvPr>
+          <p:cNvGrpSpPr/>
+          <p:nvPr/>
+        </p:nvGrpSpPr>
+        <p:grpSpPr>
+          <a:xfrm>
+            <a:off x="5953798" y="3263469"/>
+            <a:ext cx="1352348" cy="1268215"/>
+            <a:chOff x="7660176" y="744653"/>
+            <a:chExt cx="1352348" cy="1268215"/>
+          </a:xfrm>
+        </p:grpSpPr>
+        <p:sp>
+          <p:nvSpPr>
+            <p:cNvPr id="34" name="TextBox 33">
+              <a:extLst>
+                <a:ext uri="{FF2B5EF4-FFF2-40B4-BE49-F238E27FC236}">
+                  <a16:creationId xmlns:a16="http://schemas.microsoft.com/office/drawing/2014/main" id="{BB488957-E04F-4C3E-A108-6E41CA430BE9}"/>
+                </a:ext>
+              </a:extLst>
+            </p:cNvPr>
+            <p:cNvSpPr txBox="1"/>
+            <p:nvPr/>
+          </p:nvSpPr>
+          <p:spPr>
+            <a:xfrm>
+              <a:off x="7660176" y="1489648"/>
+              <a:ext cx="1352348" cy="523220"/>
+            </a:xfrm>
+            <a:prstGeom prst="rect">
+              <a:avLst/>
+            </a:prstGeom>
+            <a:noFill/>
+          </p:spPr>
+          <p:txBody>
+            <a:bodyPr wrap="square" rtlCol="0">
+              <a:spAutoFit/>
+            </a:bodyPr>
+            <a:lstStyle/>
+            <a:p>
+              <a:pPr algn="ctr"/>
+              <a:r>
+                <a:rPr lang="en-US" sz="1400" dirty="0"/>
+                <a:t>Azure SQL Database</a:t>
+              </a:r>
+              <a:endParaRPr lang="en-US" sz="1000" dirty="0"/>
+            </a:p>
+          </p:txBody>
+        </p:sp>
+        <p:pic>
+          <p:nvPicPr>
+            <p:cNvPr id="35" name="Graphic 34">
+              <a:extLst>
+                <a:ext uri="{FF2B5EF4-FFF2-40B4-BE49-F238E27FC236}">
+                  <a16:creationId xmlns:a16="http://schemas.microsoft.com/office/drawing/2014/main" id="{48330128-DD44-4488-ABF8-774FC401F6D8}"/>
+                </a:ext>
+              </a:extLst>
+            </p:cNvPr>
+            <p:cNvPicPr>
+              <a:picLocks noChangeAspect="1"/>
+            </p:cNvPicPr>
+            <p:nvPr/>
+          </p:nvPicPr>
+          <p:blipFill>
+            <a:blip r:embed="rId3">
+              <a:extLst>
+                <a:ext uri="{28A0092B-C50C-407E-A947-70E740481C1C}">
+                  <a14:useLocalDpi xmlns:a14="http://schemas.microsoft.com/office/drawing/2010/main" val="0"/>
+                </a:ext>
+                <a:ext uri="{96DAC541-7B7A-43D3-8B79-37D633B846F1}">
+                  <asvg:svgBlip xmlns:asvg="http://schemas.microsoft.com/office/drawing/2016/SVG/main" r:embed="rId4"/>
+                </a:ext>
+              </a:extLst>
+            </a:blip>
+            <a:stretch>
+              <a:fillRect/>
+            </a:stretch>
+          </p:blipFill>
+          <p:spPr>
+            <a:xfrm>
+              <a:off x="7989971" y="744653"/>
+              <a:ext cx="683112" cy="683112"/>
+            </a:xfrm>
+            <a:prstGeom prst="rect">
+              <a:avLst/>
+            </a:prstGeom>
+          </p:spPr>
+        </p:pic>
+      </p:grpSp>
+      <p:sp>
+        <p:nvSpPr>
+          <p:cNvPr id="36" name="TextBox 35">
+            <a:extLst>
+              <a:ext uri="{FF2B5EF4-FFF2-40B4-BE49-F238E27FC236}">
+                <a16:creationId xmlns:a16="http://schemas.microsoft.com/office/drawing/2014/main" id="{40C306C4-F8F1-48B6-9267-336C0CC8579A}"/>
+              </a:ext>
+            </a:extLst>
+          </p:cNvPr>
+          <p:cNvSpPr txBox="1"/>
+          <p:nvPr/>
+        </p:nvSpPr>
+        <p:spPr>
+          <a:xfrm>
+            <a:off x="5652092" y="4635559"/>
+            <a:ext cx="1958037" cy="692497"/>
+          </a:xfrm>
+          <a:prstGeom prst="rect">
+            <a:avLst/>
+          </a:prstGeom>
+          <a:noFill/>
+        </p:spPr>
+        <p:txBody>
+          <a:bodyPr wrap="none" rtlCol="0">
+            <a:spAutoFit/>
+          </a:bodyPr>
+          <a:lstStyle/>
+          <a:p>
+            <a:r>
+              <a:rPr lang="en-US" sz="1300" i="1" dirty="0"/>
+              <a:t>Storage contains historical</a:t>
+            </a:r>
+            <a:br>
+              <a:rPr lang="en-US" sz="1300" i="1" dirty="0"/>
+            </a:br>
+            <a:r>
+              <a:rPr lang="en-US" sz="1300" i="1" dirty="0"/>
+              <a:t>flight delay data and bulk</a:t>
+            </a:r>
+            <a:br>
+              <a:rPr lang="en-US" sz="1300" i="1" dirty="0"/>
+            </a:br>
+            <a:r>
+              <a:rPr lang="en-US" sz="1300" i="1" dirty="0"/>
+              <a:t>delay predictions</a:t>
+            </a:r>
+          </a:p>
+        </p:txBody>
+      </p:sp>
+      <p:grpSp>
+        <p:nvGrpSpPr>
+          <p:cNvPr id="17" name="Group 16">
+            <a:extLst>
+              <a:ext uri="{FF2B5EF4-FFF2-40B4-BE49-F238E27FC236}">
+                <a16:creationId xmlns:a16="http://schemas.microsoft.com/office/drawing/2014/main" id="{3FDABC88-356A-49CA-8650-83A17590C035}"/>
+              </a:ext>
+            </a:extLst>
+          </p:cNvPr>
+          <p:cNvGrpSpPr/>
+          <p:nvPr/>
+        </p:nvGrpSpPr>
+        <p:grpSpPr>
+          <a:xfrm>
+            <a:off x="1973931" y="3217882"/>
+            <a:ext cx="1210785" cy="1303510"/>
+            <a:chOff x="5421698" y="1312914"/>
+            <a:chExt cx="1210785" cy="1303510"/>
+          </a:xfrm>
+        </p:grpSpPr>
+        <p:pic>
+          <p:nvPicPr>
+            <p:cNvPr id="18" name="Picture 17">
+              <a:extLst>
+                <a:ext uri="{FF2B5EF4-FFF2-40B4-BE49-F238E27FC236}">
+                  <a16:creationId xmlns:a16="http://schemas.microsoft.com/office/drawing/2014/main" id="{17966F7E-D5AF-4B38-B44A-0DCC9FF368CD}"/>
+                </a:ext>
+              </a:extLst>
+            </p:cNvPr>
+            <p:cNvPicPr>
+              <a:picLocks noChangeAspect="1"/>
+            </p:cNvPicPr>
+            <p:nvPr/>
+          </p:nvPicPr>
+          <p:blipFill>
+            <a:blip r:embed="rId5">
+              <a:extLst>
+                <a:ext uri="{28A0092B-C50C-407E-A947-70E740481C1C}">
+                  <a14:useLocalDpi xmlns:a14="http://schemas.microsoft.com/office/drawing/2010/main" val="0"/>
+                </a:ext>
+              </a:extLst>
+            </a:blip>
+            <a:stretch>
+              <a:fillRect/>
+            </a:stretch>
+          </p:blipFill>
+          <p:spPr>
+            <a:xfrm>
+              <a:off x="5641117" y="1312914"/>
+              <a:ext cx="707212" cy="780290"/>
+            </a:xfrm>
+            <a:prstGeom prst="rect">
+              <a:avLst/>
+            </a:prstGeom>
+          </p:spPr>
+        </p:pic>
+        <p:sp>
+          <p:nvSpPr>
+            <p:cNvPr id="19" name="TextBox 18">
+              <a:extLst>
+                <a:ext uri="{FF2B5EF4-FFF2-40B4-BE49-F238E27FC236}">
+                  <a16:creationId xmlns:a16="http://schemas.microsoft.com/office/drawing/2014/main" id="{C0E18EE8-658A-47C0-B5CD-05CAD21FBA8C}"/>
+                </a:ext>
+              </a:extLst>
+            </p:cNvPr>
+            <p:cNvSpPr txBox="1"/>
+            <p:nvPr/>
+          </p:nvSpPr>
+          <p:spPr>
+            <a:xfrm>
+              <a:off x="5421698" y="2093204"/>
+              <a:ext cx="1210785" cy="523220"/>
+            </a:xfrm>
+            <a:prstGeom prst="rect">
+              <a:avLst/>
+            </a:prstGeom>
+            <a:noFill/>
+          </p:spPr>
+          <p:txBody>
+            <a:bodyPr wrap="square" rtlCol="0">
+              <a:spAutoFit/>
+            </a:bodyPr>
+            <a:lstStyle/>
+            <a:p>
+              <a:pPr algn="ctr"/>
+              <a:r>
+                <a:rPr lang="en-US" sz="1400" dirty="0"/>
+                <a:t>Azure Databricks</a:t>
+              </a:r>
+              <a:endParaRPr lang="en-US" sz="1100" dirty="0"/>
+            </a:p>
+          </p:txBody>
+        </p:sp>
+      </p:grpSp>
+      <p:cxnSp>
+        <p:nvCxnSpPr>
+          <p:cNvPr id="5" name="Connector: Elbow 4">
+            <a:extLst>
+              <a:ext uri="{FF2B5EF4-FFF2-40B4-BE49-F238E27FC236}">
+                <a16:creationId xmlns:a16="http://schemas.microsoft.com/office/drawing/2014/main" id="{98D17985-8327-4C9B-BECD-6A9E5D9835E9}"/>
+              </a:ext>
+            </a:extLst>
+          </p:cNvPr>
+          <p:cNvCxnSpPr>
+            <a:cxnSpLocks/>
+            <a:stCxn id="18" idx="3"/>
+            <a:endCxn id="35" idx="1"/>
+          </p:cNvCxnSpPr>
+          <p:nvPr/>
+        </p:nvCxnSpPr>
+        <p:spPr>
+          <a:xfrm flipV="1">
+            <a:off x="2900562" y="3605025"/>
+            <a:ext cx="3383031" cy="3002"/>
+          </a:xfrm>
+          <a:prstGeom prst="straightConnector1">
+            <a:avLst/>
+          </a:prstGeom>
+          <a:ln>
+            <a:tailEnd type="triangle"/>
+          </a:ln>
+        </p:spPr>
+        <p:style>
+          <a:lnRef idx="3">
+            <a:schemeClr val="accent1"/>
+          </a:lnRef>
+          <a:fillRef idx="0">
+            <a:schemeClr val="accent1"/>
+          </a:fillRef>
+          <a:effectRef idx="2">
+            <a:schemeClr val="accent1"/>
+          </a:effectRef>
+          <a:fontRef idx="minor">
+            <a:schemeClr val="tx1"/>
+          </a:fontRef>
+        </p:style>
+      </p:cxnSp>
+      <p:grpSp>
+        <p:nvGrpSpPr>
+          <p:cNvPr id="29" name="Group 28">
+            <a:extLst>
+              <a:ext uri="{FF2B5EF4-FFF2-40B4-BE49-F238E27FC236}">
+                <a16:creationId xmlns:a16="http://schemas.microsoft.com/office/drawing/2014/main" id="{CD3CF257-F9CB-43E6-AA34-E2881C15D22D}"/>
+              </a:ext>
+            </a:extLst>
+          </p:cNvPr>
+          <p:cNvGrpSpPr/>
+          <p:nvPr/>
+        </p:nvGrpSpPr>
+        <p:grpSpPr>
+          <a:xfrm>
+            <a:off x="3915903" y="1334063"/>
+            <a:ext cx="1352348" cy="1088067"/>
+            <a:chOff x="2215379" y="4759808"/>
+            <a:chExt cx="1352348" cy="1088067"/>
+          </a:xfrm>
+        </p:grpSpPr>
+        <p:pic>
+          <p:nvPicPr>
+            <p:cNvPr id="30" name="Graphic 29">
+              <a:extLst>
+                <a:ext uri="{FF2B5EF4-FFF2-40B4-BE49-F238E27FC236}">
+                  <a16:creationId xmlns:a16="http://schemas.microsoft.com/office/drawing/2014/main" id="{4DE99718-8B4F-4166-B68D-32C6FEBB80C3}"/>
+                </a:ext>
+              </a:extLst>
+            </p:cNvPr>
+            <p:cNvPicPr>
+              <a:picLocks noChangeAspect="1"/>
+            </p:cNvPicPr>
+            <p:nvPr/>
+          </p:nvPicPr>
+          <p:blipFill>
+            <a:blip r:embed="rId6">
+              <a:extLst>
+                <a:ext uri="{28A0092B-C50C-407E-A947-70E740481C1C}">
+                  <a14:useLocalDpi xmlns:a14="http://schemas.microsoft.com/office/drawing/2010/main" val="0"/>
+                </a:ext>
+                <a:ext uri="{96DAC541-7B7A-43D3-8B79-37D633B846F1}">
+                  <asvg:svgBlip xmlns:asvg="http://schemas.microsoft.com/office/drawing/2016/SVG/main" r:embed="rId7"/>
+                </a:ext>
+              </a:extLst>
+            </a:blip>
+            <a:stretch>
+              <a:fillRect/>
+            </a:stretch>
+          </p:blipFill>
+          <p:spPr>
+            <a:xfrm>
+              <a:off x="2502935" y="4759808"/>
+              <a:ext cx="780290" cy="780290"/>
+            </a:xfrm>
+            <a:prstGeom prst="rect">
+              <a:avLst/>
+            </a:prstGeom>
+          </p:spPr>
+        </p:pic>
+        <p:sp>
+          <p:nvSpPr>
+            <p:cNvPr id="31" name="TextBox 30">
+              <a:extLst>
+                <a:ext uri="{FF2B5EF4-FFF2-40B4-BE49-F238E27FC236}">
+                  <a16:creationId xmlns:a16="http://schemas.microsoft.com/office/drawing/2014/main" id="{48AEA2D9-9211-4AB2-9822-E7AADBA88C58}"/>
+                </a:ext>
+              </a:extLst>
+            </p:cNvPr>
+            <p:cNvSpPr txBox="1"/>
+            <p:nvPr/>
+          </p:nvSpPr>
+          <p:spPr>
+            <a:xfrm>
+              <a:off x="2215379" y="5540098"/>
+              <a:ext cx="1352348" cy="307777"/>
+            </a:xfrm>
+            <a:prstGeom prst="rect">
+              <a:avLst/>
+            </a:prstGeom>
+            <a:noFill/>
+          </p:spPr>
+          <p:txBody>
+            <a:bodyPr wrap="square" rtlCol="0">
+              <a:spAutoFit/>
+            </a:bodyPr>
+            <a:lstStyle/>
+            <a:p>
+              <a:pPr algn="ctr"/>
+              <a:r>
+                <a:rPr lang="en-US" sz="1400" dirty="0"/>
+                <a:t>Azure Key Vault</a:t>
+              </a:r>
+              <a:endParaRPr lang="en-US" sz="1000" dirty="0"/>
+            </a:p>
+          </p:txBody>
+        </p:sp>
+      </p:grpSp>
+      <p:sp>
+        <p:nvSpPr>
+          <p:cNvPr id="8" name="TextBox 7">
+            <a:extLst>
+              <a:ext uri="{FF2B5EF4-FFF2-40B4-BE49-F238E27FC236}">
+                <a16:creationId xmlns:a16="http://schemas.microsoft.com/office/drawing/2014/main" id="{14B0B4F9-2862-491E-9EF7-A2FCC519F32D}"/>
+              </a:ext>
+            </a:extLst>
+          </p:cNvPr>
+          <p:cNvSpPr txBox="1"/>
+          <p:nvPr/>
+        </p:nvSpPr>
+        <p:spPr>
+          <a:xfrm>
+            <a:off x="3583674" y="2455909"/>
+            <a:ext cx="2089355" cy="892552"/>
+          </a:xfrm>
+          <a:prstGeom prst="rect">
+            <a:avLst/>
+          </a:prstGeom>
+          <a:noFill/>
+        </p:spPr>
+        <p:txBody>
+          <a:bodyPr wrap="none" rtlCol="0">
+            <a:spAutoFit/>
+          </a:bodyPr>
+          <a:lstStyle/>
+          <a:p>
+            <a:r>
+              <a:rPr lang="en-US" sz="1300" i="1" dirty="0"/>
+              <a:t>Key Vault-backed Databricks</a:t>
+            </a:r>
+            <a:br>
+              <a:rPr lang="en-US" sz="1300" i="1" dirty="0"/>
+            </a:br>
+            <a:r>
+              <a:rPr lang="en-US" sz="1300" i="1" dirty="0"/>
+              <a:t>secret scope securely stores</a:t>
+            </a:r>
+            <a:br>
+              <a:rPr lang="en-US" sz="1300" i="1" dirty="0"/>
+            </a:br>
+            <a:r>
+              <a:rPr lang="en-US" sz="1300" i="1" dirty="0"/>
+              <a:t>JDBC connection string and</a:t>
+            </a:r>
+            <a:br>
+              <a:rPr lang="en-US" sz="1300" i="1" dirty="0"/>
+            </a:br>
+            <a:r>
+              <a:rPr lang="en-US" sz="1300" i="1" dirty="0"/>
+              <a:t>other secrets</a:t>
+            </a:r>
+          </a:p>
+        </p:txBody>
+      </p:sp>
+    </p:spTree>
+    <p:extLst>
+      <p:ext uri="{BB962C8B-B14F-4D97-AF65-F5344CB8AC3E}">
+        <p14:creationId xmlns:p14="http://schemas.microsoft.com/office/powerpoint/2010/main" val="1760812063"/>
+      </p:ext>
+    </p:extLst>
+  </p:cSld>
+  <p:clrMapOvr>
+    <a:masterClrMapping/>
+  </p:clrMapOvr>
+</p:sld>
+</file>
+
 <file path=ppt/theme/theme1.xml><?xml version="1.0" encoding="utf-8"?>
 <a:theme xmlns:a="http://schemas.openxmlformats.org/drawingml/2006/main" name="Office Theme">
   <a:themeElements>

</xml_diff>